<commit_message>
dernier commit pour moi
</commit_message>
<xml_diff>
--- a/powerpoint/Life Style.pptx
+++ b/powerpoint/Life Style.pptx
@@ -107,6 +107,22 @@
       </a:defRPr>
     </a:lvl9pPr>
   </p:defaultTextStyle>
+  <p:extLst>
+    <p:ext uri="{EFAFB233-063F-42B5-8137-9DF3F51BA10A}">
+      <p15:sldGuideLst xmlns:p15="http://schemas.microsoft.com/office/powerpoint/2012/main">
+        <p15:guide id="1" orient="horz" pos="2160">
+          <p15:clr>
+            <a:srgbClr val="A4A3A4"/>
+          </p15:clr>
+        </p15:guide>
+        <p15:guide id="2" pos="2880">
+          <p15:clr>
+            <a:srgbClr val="A4A3A4"/>
+          </p15:clr>
+        </p15:guide>
+      </p15:sldGuideLst>
+    </p:ext>
+  </p:extLst>
 </p:presentation>
 </file>
 
@@ -148,7 +164,7 @@
           <a:lstStyle/>
           <a:p>
             <a:r>
-              <a:rPr lang="fr-FR" smtClean="0"/>
+              <a:rPr lang="fr-FR"/>
               <a:t>Cliquez pour modifier le style du titre</a:t>
             </a:r>
             <a:endParaRPr lang="fr-CA"/>
@@ -267,7 +283,7 @@
           </a:lstStyle>
           <a:p>
             <a:r>
-              <a:rPr lang="fr-FR" smtClean="0"/>
+              <a:rPr lang="fr-FR"/>
               <a:t>Cliquez pour modifier le style des sous-titres du masque</a:t>
             </a:r>
             <a:endParaRPr lang="fr-CA"/>
@@ -382,7 +398,7 @@
           <a:lstStyle/>
           <a:p>
             <a:r>
-              <a:rPr lang="fr-FR" smtClean="0"/>
+              <a:rPr lang="fr-FR"/>
               <a:t>Cliquez pour modifier le style du titre</a:t>
             </a:r>
             <a:endParaRPr lang="fr-CA"/>
@@ -406,35 +422,35 @@
           <a:p>
             <a:pPr lvl="0"/>
             <a:r>
-              <a:rPr lang="fr-FR" smtClean="0"/>
+              <a:rPr lang="fr-FR"/>
               <a:t>Cliquez pour modifier les styles du texte du masque</a:t>
             </a:r>
           </a:p>
           <a:p>
             <a:pPr lvl="1"/>
             <a:r>
-              <a:rPr lang="fr-FR" smtClean="0"/>
+              <a:rPr lang="fr-FR"/>
               <a:t>Deuxième niveau</a:t>
             </a:r>
           </a:p>
           <a:p>
             <a:pPr lvl="2"/>
             <a:r>
-              <a:rPr lang="fr-FR" smtClean="0"/>
+              <a:rPr lang="fr-FR"/>
               <a:t>Troisième niveau</a:t>
             </a:r>
           </a:p>
           <a:p>
             <a:pPr lvl="3"/>
             <a:r>
-              <a:rPr lang="fr-FR" smtClean="0"/>
+              <a:rPr lang="fr-FR"/>
               <a:t>Quatrième niveau</a:t>
             </a:r>
           </a:p>
           <a:p>
             <a:pPr lvl="4"/>
             <a:r>
-              <a:rPr lang="fr-FR" smtClean="0"/>
+              <a:rPr lang="fr-FR"/>
               <a:t>Cinquième niveau</a:t>
             </a:r>
             <a:endParaRPr lang="fr-CA"/>
@@ -554,7 +570,7 @@
           <a:lstStyle/>
           <a:p>
             <a:r>
-              <a:rPr lang="fr-FR" smtClean="0"/>
+              <a:rPr lang="fr-FR"/>
               <a:t>Cliquez pour modifier le style du titre</a:t>
             </a:r>
             <a:endParaRPr lang="fr-CA"/>
@@ -583,35 +599,35 @@
           <a:p>
             <a:pPr lvl="0"/>
             <a:r>
-              <a:rPr lang="fr-FR" smtClean="0"/>
+              <a:rPr lang="fr-FR"/>
               <a:t>Cliquez pour modifier les styles du texte du masque</a:t>
             </a:r>
           </a:p>
           <a:p>
             <a:pPr lvl="1"/>
             <a:r>
-              <a:rPr lang="fr-FR" smtClean="0"/>
+              <a:rPr lang="fr-FR"/>
               <a:t>Deuxième niveau</a:t>
             </a:r>
           </a:p>
           <a:p>
             <a:pPr lvl="2"/>
             <a:r>
-              <a:rPr lang="fr-FR" smtClean="0"/>
+              <a:rPr lang="fr-FR"/>
               <a:t>Troisième niveau</a:t>
             </a:r>
           </a:p>
           <a:p>
             <a:pPr lvl="3"/>
             <a:r>
-              <a:rPr lang="fr-FR" smtClean="0"/>
+              <a:rPr lang="fr-FR"/>
               <a:t>Quatrième niveau</a:t>
             </a:r>
           </a:p>
           <a:p>
             <a:pPr lvl="4"/>
             <a:r>
-              <a:rPr lang="fr-FR" smtClean="0"/>
+              <a:rPr lang="fr-FR"/>
               <a:t>Cinquième niveau</a:t>
             </a:r>
             <a:endParaRPr lang="fr-CA"/>
@@ -726,7 +742,7 @@
           <a:lstStyle/>
           <a:p>
             <a:r>
-              <a:rPr lang="fr-FR" smtClean="0"/>
+              <a:rPr lang="fr-FR"/>
               <a:t>Cliquez pour modifier le style du titre</a:t>
             </a:r>
             <a:endParaRPr lang="fr-CA"/>
@@ -750,35 +766,35 @@
           <a:p>
             <a:pPr lvl="0"/>
             <a:r>
-              <a:rPr lang="fr-FR" smtClean="0"/>
+              <a:rPr lang="fr-FR"/>
               <a:t>Cliquez pour modifier les styles du texte du masque</a:t>
             </a:r>
           </a:p>
           <a:p>
             <a:pPr lvl="1"/>
             <a:r>
-              <a:rPr lang="fr-FR" smtClean="0"/>
+              <a:rPr lang="fr-FR"/>
               <a:t>Deuxième niveau</a:t>
             </a:r>
           </a:p>
           <a:p>
             <a:pPr lvl="2"/>
             <a:r>
-              <a:rPr lang="fr-FR" smtClean="0"/>
+              <a:rPr lang="fr-FR"/>
               <a:t>Troisième niveau</a:t>
             </a:r>
           </a:p>
           <a:p>
             <a:pPr lvl="3"/>
             <a:r>
-              <a:rPr lang="fr-FR" smtClean="0"/>
+              <a:rPr lang="fr-FR"/>
               <a:t>Quatrième niveau</a:t>
             </a:r>
           </a:p>
           <a:p>
             <a:pPr lvl="4"/>
             <a:r>
-              <a:rPr lang="fr-FR" smtClean="0"/>
+              <a:rPr lang="fr-FR"/>
               <a:t>Cinquième niveau</a:t>
             </a:r>
             <a:endParaRPr lang="fr-CA"/>
@@ -902,7 +918,7 @@
           </a:lstStyle>
           <a:p>
             <a:r>
-              <a:rPr lang="fr-FR" smtClean="0"/>
+              <a:rPr lang="fr-FR"/>
               <a:t>Cliquez pour modifier le style du titre</a:t>
             </a:r>
             <a:endParaRPr lang="fr-CA"/>
@@ -1022,7 +1038,7 @@
           <a:p>
             <a:pPr lvl="0"/>
             <a:r>
-              <a:rPr lang="fr-FR" smtClean="0"/>
+              <a:rPr lang="fr-FR"/>
               <a:t>Cliquez pour modifier les styles du texte du masque</a:t>
             </a:r>
           </a:p>
@@ -1136,7 +1152,7 @@
           <a:lstStyle/>
           <a:p>
             <a:r>
-              <a:rPr lang="fr-FR" smtClean="0"/>
+              <a:rPr lang="fr-FR"/>
               <a:t>Cliquez pour modifier le style du titre</a:t>
             </a:r>
             <a:endParaRPr lang="fr-CA"/>
@@ -1193,35 +1209,35 @@
           <a:p>
             <a:pPr lvl="0"/>
             <a:r>
-              <a:rPr lang="fr-FR" smtClean="0"/>
+              <a:rPr lang="fr-FR"/>
               <a:t>Cliquez pour modifier les styles du texte du masque</a:t>
             </a:r>
           </a:p>
           <a:p>
             <a:pPr lvl="1"/>
             <a:r>
-              <a:rPr lang="fr-FR" smtClean="0"/>
+              <a:rPr lang="fr-FR"/>
               <a:t>Deuxième niveau</a:t>
             </a:r>
           </a:p>
           <a:p>
             <a:pPr lvl="2"/>
             <a:r>
-              <a:rPr lang="fr-FR" smtClean="0"/>
+              <a:rPr lang="fr-FR"/>
               <a:t>Troisième niveau</a:t>
             </a:r>
           </a:p>
           <a:p>
             <a:pPr lvl="3"/>
             <a:r>
-              <a:rPr lang="fr-FR" smtClean="0"/>
+              <a:rPr lang="fr-FR"/>
               <a:t>Quatrième niveau</a:t>
             </a:r>
           </a:p>
           <a:p>
             <a:pPr lvl="4"/>
             <a:r>
-              <a:rPr lang="fr-FR" smtClean="0"/>
+              <a:rPr lang="fr-FR"/>
               <a:t>Cinquième niveau</a:t>
             </a:r>
             <a:endParaRPr lang="fr-CA"/>
@@ -1278,35 +1294,35 @@
           <a:p>
             <a:pPr lvl="0"/>
             <a:r>
-              <a:rPr lang="fr-FR" smtClean="0"/>
+              <a:rPr lang="fr-FR"/>
               <a:t>Cliquez pour modifier les styles du texte du masque</a:t>
             </a:r>
           </a:p>
           <a:p>
             <a:pPr lvl="1"/>
             <a:r>
-              <a:rPr lang="fr-FR" smtClean="0"/>
+              <a:rPr lang="fr-FR"/>
               <a:t>Deuxième niveau</a:t>
             </a:r>
           </a:p>
           <a:p>
             <a:pPr lvl="2"/>
             <a:r>
-              <a:rPr lang="fr-FR" smtClean="0"/>
+              <a:rPr lang="fr-FR"/>
               <a:t>Troisième niveau</a:t>
             </a:r>
           </a:p>
           <a:p>
             <a:pPr lvl="3"/>
             <a:r>
-              <a:rPr lang="fr-FR" smtClean="0"/>
+              <a:rPr lang="fr-FR"/>
               <a:t>Quatrième niveau</a:t>
             </a:r>
           </a:p>
           <a:p>
             <a:pPr lvl="4"/>
             <a:r>
-              <a:rPr lang="fr-FR" smtClean="0"/>
+              <a:rPr lang="fr-FR"/>
               <a:t>Cinquième niveau</a:t>
             </a:r>
             <a:endParaRPr lang="fr-CA"/>
@@ -1425,7 +1441,7 @@
           </a:lstStyle>
           <a:p>
             <a:r>
-              <a:rPr lang="fr-FR" smtClean="0"/>
+              <a:rPr lang="fr-FR"/>
               <a:t>Cliquez pour modifier le style du titre</a:t>
             </a:r>
             <a:endParaRPr lang="fr-CA"/>
@@ -1491,7 +1507,7 @@
           <a:p>
             <a:pPr lvl="0"/>
             <a:r>
-              <a:rPr lang="fr-FR" smtClean="0"/>
+              <a:rPr lang="fr-FR"/>
               <a:t>Cliquez pour modifier les styles du texte du masque</a:t>
             </a:r>
           </a:p>
@@ -1547,35 +1563,35 @@
           <a:p>
             <a:pPr lvl="0"/>
             <a:r>
-              <a:rPr lang="fr-FR" smtClean="0"/>
+              <a:rPr lang="fr-FR"/>
               <a:t>Cliquez pour modifier les styles du texte du masque</a:t>
             </a:r>
           </a:p>
           <a:p>
             <a:pPr lvl="1"/>
             <a:r>
-              <a:rPr lang="fr-FR" smtClean="0"/>
+              <a:rPr lang="fr-FR"/>
               <a:t>Deuxième niveau</a:t>
             </a:r>
           </a:p>
           <a:p>
             <a:pPr lvl="2"/>
             <a:r>
-              <a:rPr lang="fr-FR" smtClean="0"/>
+              <a:rPr lang="fr-FR"/>
               <a:t>Troisième niveau</a:t>
             </a:r>
           </a:p>
           <a:p>
             <a:pPr lvl="3"/>
             <a:r>
-              <a:rPr lang="fr-FR" smtClean="0"/>
+              <a:rPr lang="fr-FR"/>
               <a:t>Quatrième niveau</a:t>
             </a:r>
           </a:p>
           <a:p>
             <a:pPr lvl="4"/>
             <a:r>
-              <a:rPr lang="fr-FR" smtClean="0"/>
+              <a:rPr lang="fr-FR"/>
               <a:t>Cinquième niveau</a:t>
             </a:r>
             <a:endParaRPr lang="fr-CA"/>
@@ -1641,7 +1657,7 @@
           <a:p>
             <a:pPr lvl="0"/>
             <a:r>
-              <a:rPr lang="fr-FR" smtClean="0"/>
+              <a:rPr lang="fr-FR"/>
               <a:t>Cliquez pour modifier les styles du texte du masque</a:t>
             </a:r>
           </a:p>
@@ -1697,35 +1713,35 @@
           <a:p>
             <a:pPr lvl="0"/>
             <a:r>
-              <a:rPr lang="fr-FR" smtClean="0"/>
+              <a:rPr lang="fr-FR"/>
               <a:t>Cliquez pour modifier les styles du texte du masque</a:t>
             </a:r>
           </a:p>
           <a:p>
             <a:pPr lvl="1"/>
             <a:r>
-              <a:rPr lang="fr-FR" smtClean="0"/>
+              <a:rPr lang="fr-FR"/>
               <a:t>Deuxième niveau</a:t>
             </a:r>
           </a:p>
           <a:p>
             <a:pPr lvl="2"/>
             <a:r>
-              <a:rPr lang="fr-FR" smtClean="0"/>
+              <a:rPr lang="fr-FR"/>
               <a:t>Troisième niveau</a:t>
             </a:r>
           </a:p>
           <a:p>
             <a:pPr lvl="3"/>
             <a:r>
-              <a:rPr lang="fr-FR" smtClean="0"/>
+              <a:rPr lang="fr-FR"/>
               <a:t>Quatrième niveau</a:t>
             </a:r>
           </a:p>
           <a:p>
             <a:pPr lvl="4"/>
             <a:r>
-              <a:rPr lang="fr-FR" smtClean="0"/>
+              <a:rPr lang="fr-FR"/>
               <a:t>Cinquième niveau</a:t>
             </a:r>
             <a:endParaRPr lang="fr-CA"/>
@@ -1840,7 +1856,7 @@
           <a:lstStyle/>
           <a:p>
             <a:r>
-              <a:rPr lang="fr-FR" smtClean="0"/>
+              <a:rPr lang="fr-FR"/>
               <a:t>Cliquez pour modifier le style du titre</a:t>
             </a:r>
             <a:endParaRPr lang="fr-CA"/>
@@ -2056,7 +2072,7 @@
           </a:lstStyle>
           <a:p>
             <a:r>
-              <a:rPr lang="fr-FR" smtClean="0"/>
+              <a:rPr lang="fr-FR"/>
               <a:t>Cliquez pour modifier le style du titre</a:t>
             </a:r>
             <a:endParaRPr lang="fr-CA"/>
@@ -2113,35 +2129,35 @@
           <a:p>
             <a:pPr lvl="0"/>
             <a:r>
-              <a:rPr lang="fr-FR" smtClean="0"/>
+              <a:rPr lang="fr-FR"/>
               <a:t>Cliquez pour modifier les styles du texte du masque</a:t>
             </a:r>
           </a:p>
           <a:p>
             <a:pPr lvl="1"/>
             <a:r>
-              <a:rPr lang="fr-FR" smtClean="0"/>
+              <a:rPr lang="fr-FR"/>
               <a:t>Deuxième niveau</a:t>
             </a:r>
           </a:p>
           <a:p>
             <a:pPr lvl="2"/>
             <a:r>
-              <a:rPr lang="fr-FR" smtClean="0"/>
+              <a:rPr lang="fr-FR"/>
               <a:t>Troisième niveau</a:t>
             </a:r>
           </a:p>
           <a:p>
             <a:pPr lvl="3"/>
             <a:r>
-              <a:rPr lang="fr-FR" smtClean="0"/>
+              <a:rPr lang="fr-FR"/>
               <a:t>Quatrième niveau</a:t>
             </a:r>
           </a:p>
           <a:p>
             <a:pPr lvl="4"/>
             <a:r>
-              <a:rPr lang="fr-FR" smtClean="0"/>
+              <a:rPr lang="fr-FR"/>
               <a:t>Cinquième niveau</a:t>
             </a:r>
             <a:endParaRPr lang="fr-CA"/>
@@ -2207,7 +2223,7 @@
           <a:p>
             <a:pPr lvl="0"/>
             <a:r>
-              <a:rPr lang="fr-FR" smtClean="0"/>
+              <a:rPr lang="fr-FR"/>
               <a:t>Cliquez pour modifier les styles du texte du masque</a:t>
             </a:r>
           </a:p>
@@ -2330,7 +2346,7 @@
           </a:lstStyle>
           <a:p>
             <a:r>
-              <a:rPr lang="fr-FR" smtClean="0"/>
+              <a:rPr lang="fr-FR"/>
               <a:t>Cliquez pour modifier le style du titre</a:t>
             </a:r>
             <a:endParaRPr lang="fr-CA"/>
@@ -2457,7 +2473,7 @@
           <a:p>
             <a:pPr lvl="0"/>
             <a:r>
-              <a:rPr lang="fr-FR" smtClean="0"/>
+              <a:rPr lang="fr-FR"/>
               <a:t>Cliquez pour modifier les styles du texte du masque</a:t>
             </a:r>
           </a:p>
@@ -2586,7 +2602,7 @@
           <a:lstStyle/>
           <a:p>
             <a:r>
-              <a:rPr lang="fr-FR" smtClean="0"/>
+              <a:rPr lang="fr-FR"/>
               <a:t>Cliquez pour modifier le style du titre</a:t>
             </a:r>
             <a:endParaRPr lang="fr-CA"/>
@@ -2620,35 +2636,35 @@
           <a:p>
             <a:pPr lvl="0"/>
             <a:r>
-              <a:rPr lang="fr-FR" smtClean="0"/>
+              <a:rPr lang="fr-FR"/>
               <a:t>Cliquez pour modifier les styles du texte du masque</a:t>
             </a:r>
           </a:p>
           <a:p>
             <a:pPr lvl="1"/>
             <a:r>
-              <a:rPr lang="fr-FR" smtClean="0"/>
+              <a:rPr lang="fr-FR"/>
               <a:t>Deuxième niveau</a:t>
             </a:r>
           </a:p>
           <a:p>
             <a:pPr lvl="2"/>
             <a:r>
-              <a:rPr lang="fr-FR" smtClean="0"/>
+              <a:rPr lang="fr-FR"/>
               <a:t>Troisième niveau</a:t>
             </a:r>
           </a:p>
           <a:p>
             <a:pPr lvl="3"/>
             <a:r>
-              <a:rPr lang="fr-FR" smtClean="0"/>
+              <a:rPr lang="fr-FR"/>
               <a:t>Quatrième niveau</a:t>
             </a:r>
           </a:p>
           <a:p>
             <a:pPr lvl="4"/>
             <a:r>
-              <a:rPr lang="fr-FR" smtClean="0"/>
+              <a:rPr lang="fr-FR"/>
               <a:t>Cinquième niveau</a:t>
             </a:r>
             <a:endParaRPr lang="fr-CA"/>
@@ -3078,12 +3094,8 @@
           <a:lstStyle/>
           <a:p>
             <a:r>
-              <a:rPr lang="fr-CA" b="1" i="1" dirty="0" smtClean="0"/>
+              <a:rPr lang="fr-CA" b="1" i="1" dirty="0"/>
               <a:t>Life Style</a:t>
-            </a:r>
-            <a:r>
-              <a:rPr lang="fr-CA" dirty="0"/>
-              <a:t/>
             </a:r>
             <a:br>
               <a:rPr lang="fr-CA" dirty="0"/>
@@ -3103,6 +3115,10 @@
           </p:nvPr>
         </p:nvSpPr>
         <p:spPr>
+          <a:xfrm>
+            <a:off x="1371600" y="3886200"/>
+            <a:ext cx="6400800" cy="622920"/>
+          </a:xfrm>
           <a:solidFill>
             <a:schemeClr val="accent2"/>
           </a:solidFill>
@@ -3117,18 +3133,13 @@
           <a:lstStyle/>
           <a:p>
             <a:r>
-              <a:rPr lang="fr-CA" dirty="0" smtClean="0">
+              <a:rPr lang="fr-CA" dirty="0">
                 <a:solidFill>
                   <a:schemeClr val="tx1"/>
                 </a:solidFill>
               </a:rPr>
               <a:t>Vos choix, vos envies !!</a:t>
             </a:r>
-            <a:endParaRPr lang="fr-CA" dirty="0">
-              <a:solidFill>
-                <a:schemeClr val="tx1"/>
-              </a:solidFill>
-            </a:endParaRPr>
           </a:p>
         </p:txBody>
       </p:sp>
@@ -3177,10 +3188,9 @@
           <a:lstStyle/>
           <a:p>
             <a:r>
-              <a:rPr lang="fr-CA" b="1" dirty="0" smtClean="0"/>
+              <a:rPr lang="fr-CA" b="1" dirty="0"/>
               <a:t>Page d’accueil</a:t>
             </a:r>
-            <a:endParaRPr lang="fr-CA" b="1" dirty="0"/>
           </a:p>
         </p:txBody>
       </p:sp>
@@ -3233,24 +3243,8 @@
           <a:lstStyle/>
           <a:p>
             <a:r>
-              <a:rPr lang="fr-CA" dirty="0" smtClean="0"/>
-              <a:t>Life style est une </a:t>
-            </a:r>
-            <a:r>
               <a:rPr lang="fr-CA" dirty="0"/>
-              <a:t>application Web permettant d'éditer un plan de </a:t>
-            </a:r>
-            <a:r>
-              <a:rPr lang="fr-CA" dirty="0" smtClean="0"/>
-              <a:t>répartition </a:t>
-            </a:r>
-            <a:r>
-              <a:rPr lang="fr-CA" dirty="0"/>
-              <a:t>d'objets dessinés en 2d</a:t>
-            </a:r>
-            <a:r>
-              <a:rPr lang="fr-CA" dirty="0" smtClean="0"/>
-              <a:t>.</a:t>
+              <a:t>Life style est une application Web permettant d'éditer un plan de répartition d'objets dessinés en 2d.</a:t>
             </a:r>
           </a:p>
         </p:txBody>
@@ -3291,7 +3285,7 @@
           <a:lstStyle/>
           <a:p>
             <a:r>
-              <a:rPr lang="fr-CA" dirty="0" smtClean="0">
+              <a:rPr lang="fr-CA" dirty="0">
                 <a:ln w="18000">
                   <a:solidFill>
                     <a:schemeClr val="accent2">
@@ -3314,7 +3308,7 @@
           </a:p>
           <a:p>
             <a:r>
-              <a:rPr lang="fr-CA" sz="1400" b="1" dirty="0" smtClean="0">
+              <a:rPr lang="fr-CA" sz="1400" b="1" dirty="0">
                 <a:ln w="12700">
                   <a:solidFill>
                     <a:schemeClr val="tx2">
@@ -3339,7 +3333,7 @@
           </a:p>
           <a:p>
             <a:r>
-              <a:rPr lang="fr-CA" sz="1400" b="1" dirty="0" smtClean="0">
+              <a:rPr lang="fr-CA" sz="1400" b="1" dirty="0">
                 <a:ln w="12700">
                   <a:solidFill>
                     <a:schemeClr val="tx2">
@@ -3364,7 +3358,7 @@
           </a:p>
           <a:p>
             <a:r>
-              <a:rPr lang="fr-CA" sz="1400" b="1" dirty="0" smtClean="0">
+              <a:rPr lang="fr-CA" sz="1400" b="1" dirty="0">
                 <a:ln w="12700">
                   <a:solidFill>
                     <a:schemeClr val="tx2">
@@ -3388,7 +3382,7 @@
             </a:r>
           </a:p>
           <a:p>
-            <a:endParaRPr lang="fr-CA" sz="1400" b="1" dirty="0" smtClean="0">
+            <a:endParaRPr lang="fr-CA" sz="1400" b="1" dirty="0">
               <a:ln w="12700">
                 <a:solidFill>
                   <a:schemeClr val="tx2">
@@ -3411,7 +3405,7 @@
           </a:p>
           <a:p>
             <a:r>
-              <a:rPr lang="fr-CA" sz="1400" b="1" dirty="0" smtClean="0">
+              <a:rPr lang="fr-CA" sz="1400" b="1" dirty="0">
                 <a:ln w="12700">
                   <a:solidFill>
                     <a:schemeClr val="tx2">
@@ -3436,7 +3430,7 @@
           </a:p>
           <a:p>
             <a:r>
-              <a:rPr lang="fr-CA" sz="1400" b="1" dirty="0" smtClean="0">
+              <a:rPr lang="fr-CA" sz="1400" b="1" dirty="0">
                 <a:ln w="12700">
                   <a:solidFill>
                     <a:schemeClr val="tx2">
@@ -3461,7 +3455,7 @@
           </a:p>
           <a:p>
             <a:r>
-              <a:rPr lang="fr-CA" sz="1400" b="1" dirty="0" smtClean="0">
+              <a:rPr lang="fr-CA" sz="1400" b="1" dirty="0">
                 <a:ln w="12700">
                   <a:solidFill>
                     <a:schemeClr val="tx2">
@@ -3486,7 +3480,7 @@
           </a:p>
           <a:p>
             <a:r>
-              <a:rPr lang="fr-CA" sz="1400" b="1" dirty="0" smtClean="0">
+              <a:rPr lang="fr-CA" sz="1400" b="1" dirty="0">
                 <a:ln w="12700">
                   <a:solidFill>
                     <a:schemeClr val="tx2">
@@ -3577,10 +3571,9 @@
           <a:lstStyle/>
           <a:p>
             <a:r>
-              <a:rPr lang="fr-CA" b="1" dirty="0" smtClean="0"/>
+              <a:rPr lang="fr-CA" b="1" dirty="0"/>
               <a:t>Options</a:t>
             </a:r>
-            <a:endParaRPr lang="fr-CA" b="1" dirty="0"/>
           </a:p>
         </p:txBody>
       </p:sp>
@@ -3711,10 +3704,9 @@
           <a:lstStyle/>
           <a:p>
             <a:r>
-              <a:rPr lang="fr-CA" sz="1400" dirty="0" smtClean="0"/>
+              <a:rPr lang="fr-CA" sz="1400" dirty="0"/>
               <a:t>L’utilisateur pourra choisir différents types  d’objets qu’il pourra  glisser et déposer sur la page centrale. Par la suite, il pourra modifier ces mêmes objets en les agrandissant ou en les rapetissant mais aussi en modifiant leurs positions initiales. </a:t>
             </a:r>
-            <a:endParaRPr lang="fr-CA" sz="1400" dirty="0"/>
           </a:p>
         </p:txBody>
       </p:sp>
@@ -3763,10 +3755,9 @@
           <a:lstStyle/>
           <a:p>
             <a:r>
-              <a:rPr lang="fr-CA" b="1" dirty="0" smtClean="0"/>
+              <a:rPr lang="fr-CA" b="1" dirty="0"/>
               <a:t>Outils </a:t>
             </a:r>
-            <a:endParaRPr lang="fr-CA" b="1" dirty="0"/>
           </a:p>
         </p:txBody>
       </p:sp>
@@ -3878,18 +3869,13 @@
           <a:lstStyle/>
           <a:p>
             <a:r>
-              <a:rPr lang="fr-CA" sz="2000" dirty="0" smtClean="0">
+              <a:rPr lang="fr-CA" sz="2000" dirty="0">
                 <a:solidFill>
                   <a:srgbClr val="FF0000"/>
                 </a:solidFill>
               </a:rPr>
               <a:t>Boutons de manipulation pour les plans.  </a:t>
             </a:r>
-            <a:endParaRPr lang="fr-CA" sz="2000" dirty="0">
-              <a:solidFill>
-                <a:srgbClr val="FF0000"/>
-              </a:solidFill>
-            </a:endParaRPr>
           </a:p>
         </p:txBody>
       </p:sp>
@@ -3916,18 +3902,13 @@
           <a:lstStyle/>
           <a:p>
             <a:r>
-              <a:rPr lang="fr-CA" sz="2000" dirty="0" smtClean="0">
+              <a:rPr lang="fr-CA" sz="2000" dirty="0">
                 <a:solidFill>
                   <a:srgbClr val="FF0000"/>
                 </a:solidFill>
               </a:rPr>
               <a:t>Options de modification d’un élément dans le plan.</a:t>
             </a:r>
-            <a:endParaRPr lang="fr-CA" sz="2000" dirty="0">
-              <a:solidFill>
-                <a:srgbClr val="FF0000"/>
-              </a:solidFill>
-            </a:endParaRPr>
           </a:p>
         </p:txBody>
       </p:sp>
@@ -3954,18 +3935,13 @@
           <a:lstStyle/>
           <a:p>
             <a:r>
-              <a:rPr lang="fr-CA" sz="2000" dirty="0" smtClean="0">
+              <a:rPr lang="fr-CA" sz="2000" dirty="0">
                 <a:solidFill>
                   <a:srgbClr val="FF0000"/>
                 </a:solidFill>
               </a:rPr>
               <a:t>Barre de recherche </a:t>
             </a:r>
-            <a:endParaRPr lang="fr-CA" sz="2000" dirty="0">
-              <a:solidFill>
-                <a:srgbClr val="FF0000"/>
-              </a:solidFill>
-            </a:endParaRPr>
           </a:p>
         </p:txBody>
       </p:sp>

</xml_diff>